<commit_message>
kleinere Änderung an der Präsentation
</commit_message>
<xml_diff>
--- a/Vortrag/Vortrag Überarbeitet.pptx
+++ b/Vortrag/Vortrag Überarbeitet.pptx
@@ -1469,38 +1469,6 @@
         <p:txBody>
           <a:bodyPr/>
           <a:lstStyle/>
-          <a:p>
-            <a:r>
-              <a:rPr lang="de-DE" dirty="0"/>
-              <a:t>Ggf. Was ist das WZL ?</a:t>
-            </a:r>
-          </a:p>
-          <a:p>
-            <a:endParaRPr lang="de-DE" dirty="0"/>
-          </a:p>
-          <a:p>
-            <a:r>
-              <a:rPr lang="de-DE" u="sng" strike="noStrike" dirty="0">
-                <a:effectLst/>
-              </a:rPr>
-              <a:t>MES </a:t>
-            </a:r>
-            <a:r>
-              <a:rPr lang="de-DE" u="sng" strike="noStrike" dirty="0" err="1">
-                <a:effectLst/>
-              </a:rPr>
-              <a:t>vs</a:t>
-            </a:r>
-            <a:r>
-              <a:rPr lang="de-DE" u="sng" strike="noStrike" dirty="0">
-                <a:effectLst/>
-              </a:rPr>
-              <a:t> Leitsystem ???</a:t>
-            </a:r>
-          </a:p>
-          <a:p>
-            <a:endParaRPr lang="de-DE" dirty="0"/>
-          </a:p>
           <a:p>
             <a:r>
               <a:rPr lang="de-DE" dirty="0"/>
@@ -2827,7 +2795,7 @@
           <a:graphicData uri="http://schemas.openxmlformats.org/presentationml/2006/ole">
             <mc:AlternateContent xmlns:mc="http://schemas.openxmlformats.org/markup-compatibility/2006">
               <mc:Choice xmlns:v="urn:schemas-microsoft-com:vml" Requires="v">
-                <p:oleObj spid="_x0000_s2161" name="think-cell Folie" r:id="rId4" imgW="270" imgH="270" progId="TCLayout.ActiveDocument.1">
+                <p:oleObj spid="_x0000_s2166" name="think-cell Folie" r:id="rId4" imgW="270" imgH="270" progId="TCLayout.ActiveDocument.1">
                   <p:embed/>
                 </p:oleObj>
               </mc:Choice>
@@ -3813,7 +3781,7 @@
           <a:graphicData uri="http://schemas.openxmlformats.org/presentationml/2006/ole">
             <mc:AlternateContent xmlns:mc="http://schemas.openxmlformats.org/markup-compatibility/2006">
               <mc:Choice xmlns:v="urn:schemas-microsoft-com:vml" Requires="v">
-                <p:oleObj spid="_x0000_s4179" name="think-cell Folie" r:id="rId4" imgW="270" imgH="270" progId="TCLayout.ActiveDocument.1">
+                <p:oleObj spid="_x0000_s4184" name="think-cell Folie" r:id="rId4" imgW="270" imgH="270" progId="TCLayout.ActiveDocument.1">
                   <p:embed/>
                 </p:oleObj>
               </mc:Choice>
@@ -4204,7 +4172,7 @@
           <a:graphicData uri="http://schemas.openxmlformats.org/presentationml/2006/ole">
             <mc:AlternateContent xmlns:mc="http://schemas.openxmlformats.org/markup-compatibility/2006">
               <mc:Choice xmlns:v="urn:schemas-microsoft-com:vml" Requires="v">
-                <p:oleObj spid="_x0000_s1139" name="think-cell Folie" r:id="rId11" imgW="270" imgH="270" progId="TCLayout.ActiveDocument.1">
+                <p:oleObj spid="_x0000_s1144" name="think-cell Folie" r:id="rId11" imgW="270" imgH="270" progId="TCLayout.ActiveDocument.1">
                   <p:embed/>
                 </p:oleObj>
               </mc:Choice>
@@ -5412,7 +5380,7 @@
           <a:graphicData uri="http://schemas.openxmlformats.org/presentationml/2006/ole">
             <mc:AlternateContent xmlns:mc="http://schemas.openxmlformats.org/markup-compatibility/2006">
               <mc:Choice xmlns:v="urn:schemas-microsoft-com:vml" Requires="v">
-                <p:oleObj spid="_x0000_s3192" name="think-cell Folie" r:id="rId4" imgW="270" imgH="270" progId="TCLayout.ActiveDocument.1">
+                <p:oleObj spid="_x0000_s3197" name="think-cell Folie" r:id="rId4" imgW="270" imgH="270" progId="TCLayout.ActiveDocument.1">
                   <p:embed/>
                 </p:oleObj>
               </mc:Choice>
@@ -15880,7 +15848,17 @@
             </a:r>
           </a:p>
           <a:p>
-            <a:endParaRPr lang="de-DE" dirty="0"/>
+            <a:r>
+              <a:rPr lang="de-DE" dirty="0"/>
+              <a:t>Normalfälle</a:t>
+            </a:r>
+          </a:p>
+          <a:p>
+            <a:pPr lvl="1"/>
+            <a:r>
+              <a:rPr lang="de-DE" dirty="0"/>
+              <a:t>Typische Fälle</a:t>
+            </a:r>
           </a:p>
           <a:p>
             <a:r>
@@ -24624,7 +24602,7 @@
             <a:pPr lvl="1"/>
             <a:r>
               <a:rPr lang="de-DE" kern="0" dirty="0"/>
-              <a:t>Weiterentwicklung eines Biotechnologischen Leitsystems</a:t>
+              <a:t>Weiterentwicklung eines Biotechnologischen MES</a:t>
             </a:r>
           </a:p>
           <a:p>
@@ -25710,8 +25688,8 @@
           </a:p>
         </p:txBody>
       </p:sp>
-      <mc:AlternateContent xmlns:mc="http://schemas.openxmlformats.org/markup-compatibility/2006" xmlns:a14="http://schemas.microsoft.com/office/drawing/2010/main">
-        <mc:Choice Requires="a14">
+      <mc:AlternateContent xmlns:mc="http://schemas.openxmlformats.org/markup-compatibility/2006">
+        <mc:Choice xmlns:a14="http://schemas.microsoft.com/office/drawing/2010/main" Requires="a14">
           <p:sp>
             <p:nvSpPr>
               <p:cNvPr id="3" name="Textplatzhalter 2"/>
@@ -26019,13 +25997,7 @@
                 </a:pPr>
                 <a:r>
                   <a:rPr lang="de-DE" dirty="0"/>
-                  <a:t>	Zur Bestimmung wann wie viele Autos des Carsharing-	Dienstes angeboten bzw. nachgefragt werden</a:t>
-                </a:r>
-              </a:p>
-              <a:p>
-                <a:r>
-                  <a:rPr lang="de-DE" dirty="0"/>
-                  <a:t>Daten werden in Eingabedatei übergeben</a:t>
+                  <a:t>	die angeben wie viele Autos des Carsharing-	Dienstes angeboten bzw. nachgefragt werden</a:t>
                 </a:r>
               </a:p>
               <a:p>
@@ -26036,6 +26008,14 @@
               </a:p>
               <a:p>
                 <a:pPr lvl="1"/>
+                <a:r>
+                  <a:rPr lang="de-DE" b="1" dirty="0"/>
+                  <a:t>Simulationsverlauf</a:t>
+                </a:r>
+                <a:r>
+                  <a:rPr lang="de-DE" dirty="0"/>
+                  <a:t> also </a:t>
+                </a:r>
                 <a14:m>
                   <m:oMath xmlns:m="http://schemas.openxmlformats.org/officeDocument/2006/math">
                     <m:sSub>
@@ -26197,16 +26177,10 @@
                 </a14:m>
                 <a:endParaRPr lang="de-DE" dirty="0"/>
               </a:p>
-              <a:p>
-                <a:r>
-                  <a:rPr lang="de-DE" dirty="0"/>
-                  <a:t>Berechnete Daten werden in einer Ausgabedatei gespeichert</a:t>
-                </a:r>
-              </a:p>
             </p:txBody>
           </p:sp>
         </mc:Choice>
-        <mc:Fallback xmlns="">
+        <mc:Fallback>
           <p:sp>
             <p:nvSpPr>
               <p:cNvPr id="3" name="Textplatzhalter 2"/>

</xml_diff>

<commit_message>
finale Änderungen am Vortrag
</commit_message>
<xml_diff>
--- a/Vortrag/Vortrag Überarbeitet.pptx
+++ b/Vortrag/Vortrag Überarbeitet.pptx
@@ -254,7 +254,7 @@
           <a:p>
             <a:fld id="{99FD8356-C095-4EDD-9AA3-D4CB5ADA83BF}" type="datetimeFigureOut">
               <a:rPr lang="de-DE" smtClean="0"/>
-              <a:t>22.08.2017</a:t>
+              <a:t>23.08.2017</a:t>
             </a:fld>
             <a:endParaRPr lang="de-DE"/>
           </a:p>
@@ -2715,6 +2715,27 @@
               <a:t> =&gt; Sortierung nach zeitlichem Auftreten =&gt; Durchlaufen aller Änderungen &amp; Maximum bestimmen</a:t>
             </a:r>
           </a:p>
+          <a:p>
+            <a:endParaRPr lang="de-DE" dirty="0"/>
+          </a:p>
+          <a:p>
+            <a:r>
+              <a:rPr lang="de-DE" b="1" dirty="0"/>
+              <a:t>Simulationsverlauf</a:t>
+            </a:r>
+            <a:r>
+              <a:rPr lang="de-DE" dirty="0"/>
+              <a:t> =&gt; Zeitlich sortierte Änderungen zu </a:t>
+            </a:r>
+            <a:r>
+              <a:rPr lang="de-DE" dirty="0" err="1"/>
+              <a:t>string</a:t>
+            </a:r>
+            <a:r>
+              <a:rPr lang="de-DE" dirty="0"/>
+              <a:t> in eine Liste</a:t>
+            </a:r>
+          </a:p>
         </p:txBody>
       </p:sp>
       <p:sp>
@@ -2795,7 +2816,7 @@
           <a:graphicData uri="http://schemas.openxmlformats.org/presentationml/2006/ole">
             <mc:AlternateContent xmlns:mc="http://schemas.openxmlformats.org/markup-compatibility/2006">
               <mc:Choice xmlns:v="urn:schemas-microsoft-com:vml" Requires="v">
-                <p:oleObj spid="_x0000_s2166" name="think-cell Folie" r:id="rId4" imgW="270" imgH="270" progId="TCLayout.ActiveDocument.1">
+                <p:oleObj spid="_x0000_s2169" name="think-cell Folie" r:id="rId4" imgW="270" imgH="270" progId="TCLayout.ActiveDocument.1">
                   <p:embed/>
                 </p:oleObj>
               </mc:Choice>
@@ -3781,7 +3802,7 @@
           <a:graphicData uri="http://schemas.openxmlformats.org/presentationml/2006/ole">
             <mc:AlternateContent xmlns:mc="http://schemas.openxmlformats.org/markup-compatibility/2006">
               <mc:Choice xmlns:v="urn:schemas-microsoft-com:vml" Requires="v">
-                <p:oleObj spid="_x0000_s4184" name="think-cell Folie" r:id="rId4" imgW="270" imgH="270" progId="TCLayout.ActiveDocument.1">
+                <p:oleObj spid="_x0000_s4187" name="think-cell Folie" r:id="rId4" imgW="270" imgH="270" progId="TCLayout.ActiveDocument.1">
                   <p:embed/>
                 </p:oleObj>
               </mc:Choice>
@@ -4172,7 +4193,7 @@
           <a:graphicData uri="http://schemas.openxmlformats.org/presentationml/2006/ole">
             <mc:AlternateContent xmlns:mc="http://schemas.openxmlformats.org/markup-compatibility/2006">
               <mc:Choice xmlns:v="urn:schemas-microsoft-com:vml" Requires="v">
-                <p:oleObj spid="_x0000_s1144" name="think-cell Folie" r:id="rId11" imgW="270" imgH="270" progId="TCLayout.ActiveDocument.1">
+                <p:oleObj spid="_x0000_s1147" name="think-cell Folie" r:id="rId11" imgW="270" imgH="270" progId="TCLayout.ActiveDocument.1">
                   <p:embed/>
                 </p:oleObj>
               </mc:Choice>
@@ -5380,7 +5401,7 @@
           <a:graphicData uri="http://schemas.openxmlformats.org/presentationml/2006/ole">
             <mc:AlternateContent xmlns:mc="http://schemas.openxmlformats.org/markup-compatibility/2006">
               <mc:Choice xmlns:v="urn:schemas-microsoft-com:vml" Requires="v">
-                <p:oleObj spid="_x0000_s3197" name="think-cell Folie" r:id="rId4" imgW="270" imgH="270" progId="TCLayout.ActiveDocument.1">
+                <p:oleObj spid="_x0000_s3200" name="think-cell Folie" r:id="rId4" imgW="270" imgH="270" progId="TCLayout.ActiveDocument.1">
                   <p:embed/>
                 </p:oleObj>
               </mc:Choice>
@@ -12200,6 +12221,90 @@
           </a:p>
         </p:txBody>
       </p:sp>
+      <p:sp>
+        <p:nvSpPr>
+          <p:cNvPr id="11" name="Rechteck 10">
+            <a:extLst>
+              <a:ext uri="{FF2B5EF4-FFF2-40B4-BE49-F238E27FC236}">
+                <a16:creationId xmlns:a16="http://schemas.microsoft.com/office/drawing/2014/main" id="{5E3954B3-2A21-42D7-97F5-DCDCFDA6C799}"/>
+              </a:ext>
+            </a:extLst>
+          </p:cNvPr>
+          <p:cNvSpPr/>
+          <p:nvPr/>
+        </p:nvSpPr>
+        <p:spPr bwMode="auto">
+          <a:xfrm>
+            <a:off x="2227543" y="5311318"/>
+            <a:ext cx="2788957" cy="149682"/>
+          </a:xfrm>
+          <a:prstGeom prst="rect">
+            <a:avLst/>
+          </a:prstGeom>
+          <a:noFill/>
+          <a:ln w="19050" cap="flat" cmpd="sng" algn="ctr">
+            <a:solidFill>
+              <a:schemeClr val="accent5"/>
+            </a:solidFill>
+            <a:prstDash val="solid"/>
+            <a:round/>
+            <a:headEnd type="none" w="med" len="med"/>
+            <a:tailEnd type="none" w="med" len="med"/>
+          </a:ln>
+          <a:extLst/>
+        </p:spPr>
+        <p:style>
+          <a:lnRef idx="0">
+            <a:scrgbClr r="0" g="0" b="0"/>
+          </a:lnRef>
+          <a:fillRef idx="0">
+            <a:scrgbClr r="0" g="0" b="0"/>
+          </a:fillRef>
+          <a:effectRef idx="0">
+            <a:scrgbClr r="0" g="0" b="0"/>
+          </a:effectRef>
+          <a:fontRef idx="minor">
+            <a:schemeClr val="accent5"/>
+          </a:fontRef>
+        </p:style>
+        <p:txBody>
+          <a:bodyPr rot="0" spcFirstLastPara="0" vertOverflow="overflow" horzOverflow="overflow" vert="horz" wrap="square" lIns="91440" tIns="45720" rIns="91440" bIns="45720" numCol="1" spcCol="0" rtlCol="0" fromWordArt="0" anchor="ctr" anchorCtr="0" forceAA="0" compatLnSpc="1">
+            <a:prstTxWarp prst="textNoShape">
+              <a:avLst/>
+            </a:prstTxWarp>
+            <a:noAutofit/>
+          </a:bodyPr>
+          <a:lstStyle/>
+          <a:p>
+            <a:pPr marL="0" marR="0" indent="0" algn="ctr" defTabSz="914400" rtl="0" eaLnBrk="1" fontAlgn="base" latinLnBrk="0" hangingPunct="1">
+              <a:lnSpc>
+                <a:spcPct val="100000"/>
+              </a:lnSpc>
+              <a:spcBef>
+                <a:spcPct val="0"/>
+              </a:spcBef>
+              <a:spcAft>
+                <a:spcPct val="0"/>
+              </a:spcAft>
+              <a:buClrTx/>
+              <a:buSzTx/>
+              <a:buFontTx/>
+              <a:buNone/>
+              <a:tabLst/>
+            </a:pPr>
+            <a:endParaRPr kumimoji="0" lang="de-DE" sz="1800" b="0" i="0" u="none" strike="noStrike" cap="none" normalizeH="0" baseline="0" dirty="0" err="1">
+              <a:ln>
+                <a:noFill/>
+              </a:ln>
+              <a:solidFill>
+                <a:schemeClr val="bg1"/>
+              </a:solidFill>
+              <a:effectLst/>
+              <a:latin typeface="Arial" charset="0"/>
+            </a:endParaRPr>
+          </a:p>
+        </p:txBody>
+      </p:sp>
     </p:spTree>
     <p:custDataLst>
       <p:tags r:id="rId1"/>
@@ -12275,8 +12380,8 @@
           </a:p>
         </p:txBody>
       </p:sp>
-      <mc:AlternateContent xmlns:mc="http://schemas.openxmlformats.org/markup-compatibility/2006" xmlns:a14="http://schemas.microsoft.com/office/drawing/2010/main">
-        <mc:Choice Requires="a14">
+      <mc:AlternateContent xmlns:mc="http://schemas.openxmlformats.org/markup-compatibility/2006">
+        <mc:Choice xmlns:a14="http://schemas.microsoft.com/office/drawing/2010/main" Requires="a14">
           <p:sp>
             <p:nvSpPr>
               <p:cNvPr id="6" name="Textplatzhalter 5">
@@ -12363,27 +12468,40 @@
               <a:p>
                 <a:r>
                   <a:rPr lang="de-DE" dirty="0"/>
-                  <a:t>Der maximale Bedarf entspricht dem maximalen Funktionswert der Bedarfsfunktion</a:t>
+                  <a:t>Bestimmen des Simulationsverlaufs</a:t>
                 </a:r>
               </a:p>
               <a:p>
                 <a:pPr lvl="1"/>
                 <a:r>
                   <a:rPr lang="de-DE" dirty="0"/>
-                  <a:t>Alle Änderungen werden nach zeitlichem Auftreten sortiert (bei gleichzeitigen Änderungen hat die Abstellung Vorrang)</a:t>
+                  <a:t>Änderungen sortiert nach zeitlichem Auftreten</a:t>
+                </a:r>
+              </a:p>
+              <a:p>
+                <a:r>
+                  <a:rPr lang="de-DE" dirty="0"/>
+                  <a:t>Der maximale Bedarf </a:t>
                 </a:r>
               </a:p>
               <a:p>
                 <a:pPr lvl="1"/>
                 <a:r>
                   <a:rPr lang="de-DE" dirty="0"/>
-                  <a:t>Es wird durch alle Änderungen iteriert und so der Maximalwert ermittelt</a:t>
+                  <a:t>Alle Änderungen werden nach zeitlichem Auftreten sortiert</a:t>
+                </a:r>
+              </a:p>
+              <a:p>
+                <a:pPr lvl="1"/>
+                <a:r>
+                  <a:rPr lang="de-DE" dirty="0"/>
+                  <a:t>Maximalwert wird ermittelt</a:t>
                 </a:r>
               </a:p>
             </p:txBody>
           </p:sp>
         </mc:Choice>
-        <mc:Fallback xmlns="">
+        <mc:Fallback>
           <p:sp>
             <p:nvSpPr>
               <p:cNvPr id="6" name="Textplatzhalter 5">
@@ -25688,8 +25806,8 @@
           </a:p>
         </p:txBody>
       </p:sp>
-      <mc:AlternateContent xmlns:mc="http://schemas.openxmlformats.org/markup-compatibility/2006">
-        <mc:Choice xmlns:a14="http://schemas.microsoft.com/office/drawing/2010/main" Requires="a14">
+      <mc:AlternateContent xmlns:mc="http://schemas.openxmlformats.org/markup-compatibility/2006" xmlns:a14="http://schemas.microsoft.com/office/drawing/2010/main">
+        <mc:Choice Requires="a14">
           <p:sp>
             <p:nvSpPr>
               <p:cNvPr id="3" name="Textplatzhalter 2"/>
@@ -26180,7 +26298,7 @@
             </p:txBody>
           </p:sp>
         </mc:Choice>
-        <mc:Fallback>
+        <mc:Fallback xmlns="">
           <p:sp>
             <p:nvSpPr>
               <p:cNvPr id="3" name="Textplatzhalter 2"/>

</xml_diff>